<commit_message>
Task 8 : Präsentation update.
</commit_message>
<xml_diff>
--- a/Project Pink/doc/Task08/MHC-pms Task8.pptx
+++ b/Project Pink/doc/Task08/MHC-pms Task8.pptx
@@ -5,13 +5,14 @@
     <p:sldMasterId id="2147483660" r:id="rId1"/>
   </p:sldMasterIdLst>
   <p:notesMasterIdLst>
-    <p:notesMasterId r:id="rId6"/>
+    <p:notesMasterId r:id="rId7"/>
   </p:notesMasterIdLst>
   <p:sldIdLst>
     <p:sldId id="263" r:id="rId2"/>
     <p:sldId id="257" r:id="rId3"/>
-    <p:sldId id="261" r:id="rId4"/>
-    <p:sldId id="256" r:id="rId5"/>
+    <p:sldId id="264" r:id="rId4"/>
+    <p:sldId id="261" r:id="rId5"/>
+    <p:sldId id="256" r:id="rId6"/>
   </p:sldIdLst>
   <p:sldSz cx="9144000" cy="6858000" type="screen4x3"/>
   <p:notesSz cx="6858000" cy="9144000"/>
@@ -395,7 +396,7 @@
     </p:spTree>
     <p:extLst>
       <p:ext uri="{BB962C8B-B14F-4D97-AF65-F5344CB8AC3E}">
-        <p14:creationId xmlns="" xmlns:p14="http://schemas.microsoft.com/office/powerpoint/2010/main" val="2836355673"/>
+        <p14:creationId xmlns:p14="http://schemas.microsoft.com/office/powerpoint/2010/main" val="2836355673"/>
       </p:ext>
     </p:extLst>
   </p:cSld>
@@ -620,7 +621,142 @@
     </p:spTree>
     <p:extLst>
       <p:ext uri="{BB962C8B-B14F-4D97-AF65-F5344CB8AC3E}">
-        <p14:creationId xmlns="" xmlns:p14="http://schemas.microsoft.com/office/powerpoint/2010/main" val="499187048"/>
+        <p14:creationId xmlns:p14="http://schemas.microsoft.com/office/powerpoint/2010/main" val="499187048"/>
+      </p:ext>
+    </p:extLst>
+  </p:cSld>
+  <p:clrMapOvr>
+    <a:masterClrMapping/>
+  </p:clrMapOvr>
+</p:notes>
+</file>
+
+<file path=ppt/notesSlides/notesSlide2.xml><?xml version="1.0" encoding="utf-8"?>
+<p:notes xmlns:a="http://schemas.openxmlformats.org/drawingml/2006/main" xmlns:r="http://schemas.openxmlformats.org/officeDocument/2006/relationships" xmlns:p="http://schemas.openxmlformats.org/presentationml/2006/main">
+  <p:cSld>
+    <p:spTree>
+      <p:nvGrpSpPr>
+        <p:cNvPr id="1" name=""/>
+        <p:cNvGrpSpPr/>
+        <p:nvPr/>
+      </p:nvGrpSpPr>
+      <p:grpSpPr>
+        <a:xfrm>
+          <a:off x="0" y="0"/>
+          <a:ext cx="0" cy="0"/>
+          <a:chOff x="0" y="0"/>
+          <a:chExt cx="0" cy="0"/>
+        </a:xfrm>
+      </p:grpSpPr>
+      <p:sp>
+        <p:nvSpPr>
+          <p:cNvPr id="2" name="Folienbildplatzhalter 1"/>
+          <p:cNvSpPr>
+            <a:spLocks noGrp="1" noRot="1" noChangeAspect="1"/>
+          </p:cNvSpPr>
+          <p:nvPr>
+            <p:ph type="sldImg"/>
+          </p:nvPr>
+        </p:nvSpPr>
+        <p:spPr/>
+      </p:sp>
+      <p:sp>
+        <p:nvSpPr>
+          <p:cNvPr id="3" name="Notizenplatzhalter 2"/>
+          <p:cNvSpPr>
+            <a:spLocks noGrp="1"/>
+          </p:cNvSpPr>
+          <p:nvPr>
+            <p:ph type="body" idx="1"/>
+          </p:nvPr>
+        </p:nvSpPr>
+        <p:spPr/>
+        <p:txBody>
+          <a:bodyPr/>
+          <a:lstStyle/>
+          <a:p>
+            <a:r>
+              <a:rPr lang="de-CH" dirty="0" err="1" smtClean="0"/>
+              <a:t>Medi</a:t>
+            </a:r>
+            <a:r>
+              <a:rPr lang="de-CH" baseline="0" dirty="0" err="1" smtClean="0"/>
+              <a:t>Service</a:t>
+            </a:r>
+            <a:r>
+              <a:rPr lang="de-CH" baseline="0" dirty="0" smtClean="0"/>
+              <a:t>: die </a:t>
+            </a:r>
+            <a:r>
+              <a:rPr lang="de-CH" baseline="0" dirty="0" err="1" smtClean="0"/>
+              <a:t>MediService</a:t>
+            </a:r>
+            <a:r>
+              <a:rPr lang="de-CH" baseline="0" dirty="0" smtClean="0"/>
+              <a:t> Klasse ist eine Funktionsklasse für das verschreiben von Medikamenten, um die ganzen Abklärungen (allergiene, andere Medikamente etc.) zu machen und das Rezept zu erstellen.</a:t>
+            </a:r>
+          </a:p>
+          <a:p>
+            <a:endParaRPr lang="de-CH" baseline="0" dirty="0" smtClean="0"/>
+          </a:p>
+          <a:p>
+            <a:r>
+              <a:rPr lang="de-CH" baseline="0" dirty="0" smtClean="0"/>
+              <a:t>Person: Patient </a:t>
+            </a:r>
+            <a:r>
+              <a:rPr lang="de-CH" baseline="0" dirty="0" err="1" smtClean="0"/>
+              <a:t>und,Doctor</a:t>
+            </a:r>
+            <a:r>
+              <a:rPr lang="de-CH" baseline="0" dirty="0" smtClean="0"/>
+              <a:t> sind Subklassen von Person, wahrscheinlich würde hierzu noch eine separate </a:t>
+            </a:r>
+            <a:r>
+              <a:rPr lang="de-CH" baseline="0" dirty="0" err="1" smtClean="0"/>
+              <a:t>Adress</a:t>
+            </a:r>
+            <a:r>
+              <a:rPr lang="de-CH" baseline="0" dirty="0" smtClean="0"/>
+              <a:t> klasse gehören.</a:t>
+            </a:r>
+          </a:p>
+          <a:p>
+            <a:endParaRPr lang="de-CH" baseline="0" dirty="0" smtClean="0"/>
+          </a:p>
+          <a:p>
+            <a:endParaRPr lang="de-CH" dirty="0"/>
+          </a:p>
+        </p:txBody>
+      </p:sp>
+      <p:sp>
+        <p:nvSpPr>
+          <p:cNvPr id="4" name="Foliennummernplatzhalter 3"/>
+          <p:cNvSpPr>
+            <a:spLocks noGrp="1"/>
+          </p:cNvSpPr>
+          <p:nvPr>
+            <p:ph type="sldNum" sz="quarter" idx="10"/>
+          </p:nvPr>
+        </p:nvSpPr>
+        <p:spPr/>
+        <p:txBody>
+          <a:bodyPr/>
+          <a:lstStyle/>
+          <a:p>
+            <a:fld id="{D645909B-DE3D-42BA-8D5F-DA988BBD025B}" type="slidenum">
+              <a:rPr lang="de-CH" smtClean="0"/>
+              <a:pPr/>
+              <a:t>3</a:t>
+            </a:fld>
+            <a:endParaRPr lang="de-CH"/>
+          </a:p>
+        </p:txBody>
+      </p:sp>
+    </p:spTree>
+    <p:extLst>
+      <p:ext uri="{BB962C8B-B14F-4D97-AF65-F5344CB8AC3E}">
+        <p14:creationId xmlns:p14="http://schemas.microsoft.com/office/powerpoint/2010/main" val="499187048"/>
       </p:ext>
     </p:extLst>
   </p:cSld>
@@ -5365,11 +5501,7 @@
             </a:r>
             <a:r>
               <a:rPr lang="de-DE" dirty="0" smtClean="0"/>
-              <a:t> TAKS </a:t>
-            </a:r>
-            <a:r>
-              <a:rPr lang="de-DE" dirty="0" smtClean="0"/>
-              <a:t>8</a:t>
+              <a:t> TAKS 8</a:t>
             </a:r>
             <a:endParaRPr lang="de-DE" dirty="0"/>
           </a:p>
@@ -5490,7 +5622,7 @@
     </p:spTree>
     <p:extLst>
       <p:ext uri="{BB962C8B-B14F-4D97-AF65-F5344CB8AC3E}">
-        <p14:creationId xmlns="" xmlns:p14="http://schemas.microsoft.com/office/powerpoint/2010/main" val="194796538"/>
+        <p14:creationId xmlns:p14="http://schemas.microsoft.com/office/powerpoint/2010/main" val="194796538"/>
       </p:ext>
     </p:extLst>
   </p:cSld>
@@ -5508,6 +5640,106 @@
 </file>
 
 <file path=ppt/slides/slide3.xml><?xml version="1.0" encoding="utf-8"?>
+<p:sld xmlns:a="http://schemas.openxmlformats.org/drawingml/2006/main" xmlns:r="http://schemas.openxmlformats.org/officeDocument/2006/relationships" xmlns:p="http://schemas.openxmlformats.org/presentationml/2006/main" showMasterSp="0">
+  <p:cSld>
+    <p:spTree>
+      <p:nvGrpSpPr>
+        <p:cNvPr id="1" name=""/>
+        <p:cNvGrpSpPr/>
+        <p:nvPr/>
+      </p:nvGrpSpPr>
+      <p:grpSpPr>
+        <a:xfrm>
+          <a:off x="0" y="0"/>
+          <a:ext cx="0" cy="0"/>
+          <a:chOff x="0" y="0"/>
+          <a:chExt cx="0" cy="0"/>
+        </a:xfrm>
+      </p:grpSpPr>
+      <p:sp>
+        <p:nvSpPr>
+          <p:cNvPr id="2" name="Titel 1"/>
+          <p:cNvSpPr>
+            <a:spLocks noGrp="1"/>
+          </p:cNvSpPr>
+          <p:nvPr>
+            <p:ph type="title"/>
+          </p:nvPr>
+        </p:nvSpPr>
+        <p:spPr>
+          <a:xfrm>
+            <a:off x="723468" y="72048"/>
+            <a:ext cx="7520940" cy="548640"/>
+          </a:xfrm>
+        </p:spPr>
+        <p:txBody>
+          <a:bodyPr/>
+          <a:lstStyle/>
+          <a:p>
+            <a:pPr algn="ctr"/>
+            <a:r>
+              <a:rPr lang="de-CH" dirty="0" smtClean="0"/>
+              <a:t>Package </a:t>
+            </a:r>
+            <a:r>
+              <a:rPr lang="de-CH" dirty="0" err="1" smtClean="0"/>
+              <a:t>Diagram</a:t>
+            </a:r>
+            <a:endParaRPr lang="de-CH" dirty="0"/>
+          </a:p>
+        </p:txBody>
+      </p:sp>
+      <p:pic>
+        <p:nvPicPr>
+          <p:cNvPr id="3" name="Grafik 2"/>
+          <p:cNvPicPr>
+            <a:picLocks noChangeAspect="1"/>
+          </p:cNvPicPr>
+          <p:nvPr/>
+        </p:nvPicPr>
+        <p:blipFill>
+          <a:blip r:embed="rId3">
+            <a:extLst>
+              <a:ext uri="{28A0092B-C50C-407E-A947-70E740481C1C}">
+                <a14:useLocalDpi xmlns:a14="http://schemas.microsoft.com/office/drawing/2010/main" val="0"/>
+              </a:ext>
+            </a:extLst>
+          </a:blip>
+          <a:stretch>
+            <a:fillRect/>
+          </a:stretch>
+        </p:blipFill>
+        <p:spPr>
+          <a:xfrm>
+            <a:off x="0" y="1124744"/>
+            <a:ext cx="9144000" cy="4740639"/>
+          </a:xfrm>
+          <a:prstGeom prst="rect">
+            <a:avLst/>
+          </a:prstGeom>
+        </p:spPr>
+      </p:pic>
+    </p:spTree>
+    <p:extLst>
+      <p:ext uri="{BB962C8B-B14F-4D97-AF65-F5344CB8AC3E}">
+        <p14:creationId xmlns:p14="http://schemas.microsoft.com/office/powerpoint/2010/main" val="955867869"/>
+      </p:ext>
+    </p:extLst>
+  </p:cSld>
+  <p:clrMapOvr>
+    <a:masterClrMapping/>
+  </p:clrMapOvr>
+  <p:timing>
+    <p:tnLst>
+      <p:par>
+        <p:cTn id="1" dur="indefinite" restart="never" nodeType="tmRoot"/>
+      </p:par>
+    </p:tnLst>
+  </p:timing>
+</p:sld>
+</file>
+
+<file path=ppt/slides/slide4.xml><?xml version="1.0" encoding="utf-8"?>
 <p:sld xmlns:a="http://schemas.openxmlformats.org/drawingml/2006/main" xmlns:r="http://schemas.openxmlformats.org/officeDocument/2006/relationships" xmlns:p="http://schemas.openxmlformats.org/presentationml/2006/main" showMasterSp="0">
   <p:cSld>
     <p:spTree>
@@ -5551,7 +5783,7 @@
     </p:spTree>
     <p:extLst>
       <p:ext uri="{BB962C8B-B14F-4D97-AF65-F5344CB8AC3E}">
-        <p14:creationId xmlns="" xmlns:p14="http://schemas.microsoft.com/office/powerpoint/2010/main" val="203655813"/>
+        <p14:creationId xmlns:p14="http://schemas.microsoft.com/office/powerpoint/2010/main" val="203655813"/>
       </p:ext>
     </p:extLst>
   </p:cSld>
@@ -5568,7 +5800,7 @@
 </p:sld>
 </file>
 
-<file path=ppt/slides/slide4.xml><?xml version="1.0" encoding="utf-8"?>
+<file path=ppt/slides/slide5.xml><?xml version="1.0" encoding="utf-8"?>
 <p:sld xmlns:a="http://schemas.openxmlformats.org/drawingml/2006/main" xmlns:r="http://schemas.openxmlformats.org/officeDocument/2006/relationships" xmlns:p="http://schemas.openxmlformats.org/presentationml/2006/main">
   <p:cSld>
     <p:spTree>

</xml_diff>